<commit_message>
Atualizaçãop do ppt para apresentação
</commit_message>
<xml_diff>
--- a/Pesquisa & Inovação/Planilha de Risco.pptx
+++ b/Pesquisa & Inovação/Planilha de Risco.pptx
@@ -259,7 +259,7 @@
           <a:p>
             <a:fld id="{D7AB5D50-9DD8-4A40-877E-61895EE3D064}" type="datetimeFigureOut">
               <a:rPr lang="pt-BR" smtClean="0"/>
-              <a:t>19/10/2020</a:t>
+              <a:t>09/12/2020</a:t>
             </a:fld>
             <a:endParaRPr lang="pt-BR"/>
           </a:p>
@@ -313,7 +313,7 @@
           <a:p>
             <a:fld id="{56CB71BA-E9E2-4B4F-82E8-D03ACE321088}" type="slidenum">
               <a:rPr lang="pt-BR" smtClean="0"/>
-              <a:t>‹nº›</a:t>
+              <a:t>‹#›</a:t>
             </a:fld>
             <a:endParaRPr lang="pt-BR"/>
           </a:p>
@@ -457,7 +457,7 @@
           <a:p>
             <a:fld id="{D7AB5D50-9DD8-4A40-877E-61895EE3D064}" type="datetimeFigureOut">
               <a:rPr lang="pt-BR" smtClean="0"/>
-              <a:t>19/10/2020</a:t>
+              <a:t>09/12/2020</a:t>
             </a:fld>
             <a:endParaRPr lang="pt-BR"/>
           </a:p>
@@ -511,7 +511,7 @@
           <a:p>
             <a:fld id="{56CB71BA-E9E2-4B4F-82E8-D03ACE321088}" type="slidenum">
               <a:rPr lang="pt-BR" smtClean="0"/>
-              <a:t>‹nº›</a:t>
+              <a:t>‹#›</a:t>
             </a:fld>
             <a:endParaRPr lang="pt-BR"/>
           </a:p>
@@ -665,7 +665,7 @@
           <a:p>
             <a:fld id="{D7AB5D50-9DD8-4A40-877E-61895EE3D064}" type="datetimeFigureOut">
               <a:rPr lang="pt-BR" smtClean="0"/>
-              <a:t>19/10/2020</a:t>
+              <a:t>09/12/2020</a:t>
             </a:fld>
             <a:endParaRPr lang="pt-BR"/>
           </a:p>
@@ -719,7 +719,7 @@
           <a:p>
             <a:fld id="{56CB71BA-E9E2-4B4F-82E8-D03ACE321088}" type="slidenum">
               <a:rPr lang="pt-BR" smtClean="0"/>
-              <a:t>‹nº›</a:t>
+              <a:t>‹#›</a:t>
             </a:fld>
             <a:endParaRPr lang="pt-BR"/>
           </a:p>
@@ -863,7 +863,7 @@
           <a:p>
             <a:fld id="{D7AB5D50-9DD8-4A40-877E-61895EE3D064}" type="datetimeFigureOut">
               <a:rPr lang="pt-BR" smtClean="0"/>
-              <a:t>19/10/2020</a:t>
+              <a:t>09/12/2020</a:t>
             </a:fld>
             <a:endParaRPr lang="pt-BR"/>
           </a:p>
@@ -917,7 +917,7 @@
           <a:p>
             <a:fld id="{56CB71BA-E9E2-4B4F-82E8-D03ACE321088}" type="slidenum">
               <a:rPr lang="pt-BR" smtClean="0"/>
-              <a:t>‹nº›</a:t>
+              <a:t>‹#›</a:t>
             </a:fld>
             <a:endParaRPr lang="pt-BR"/>
           </a:p>
@@ -1138,7 +1138,7 @@
           <a:p>
             <a:fld id="{D7AB5D50-9DD8-4A40-877E-61895EE3D064}" type="datetimeFigureOut">
               <a:rPr lang="pt-BR" smtClean="0"/>
-              <a:t>19/10/2020</a:t>
+              <a:t>09/12/2020</a:t>
             </a:fld>
             <a:endParaRPr lang="pt-BR"/>
           </a:p>
@@ -1192,7 +1192,7 @@
           <a:p>
             <a:fld id="{56CB71BA-E9E2-4B4F-82E8-D03ACE321088}" type="slidenum">
               <a:rPr lang="pt-BR" smtClean="0"/>
-              <a:t>‹nº›</a:t>
+              <a:t>‹#›</a:t>
             </a:fld>
             <a:endParaRPr lang="pt-BR"/>
           </a:p>
@@ -1403,7 +1403,7 @@
           <a:p>
             <a:fld id="{D7AB5D50-9DD8-4A40-877E-61895EE3D064}" type="datetimeFigureOut">
               <a:rPr lang="pt-BR" smtClean="0"/>
-              <a:t>19/10/2020</a:t>
+              <a:t>09/12/2020</a:t>
             </a:fld>
             <a:endParaRPr lang="pt-BR"/>
           </a:p>
@@ -1457,7 +1457,7 @@
           <a:p>
             <a:fld id="{56CB71BA-E9E2-4B4F-82E8-D03ACE321088}" type="slidenum">
               <a:rPr lang="pt-BR" smtClean="0"/>
-              <a:t>‹nº›</a:t>
+              <a:t>‹#›</a:t>
             </a:fld>
             <a:endParaRPr lang="pt-BR"/>
           </a:p>
@@ -1815,7 +1815,7 @@
           <a:p>
             <a:fld id="{D7AB5D50-9DD8-4A40-877E-61895EE3D064}" type="datetimeFigureOut">
               <a:rPr lang="pt-BR" smtClean="0"/>
-              <a:t>19/10/2020</a:t>
+              <a:t>09/12/2020</a:t>
             </a:fld>
             <a:endParaRPr lang="pt-BR"/>
           </a:p>
@@ -1869,7 +1869,7 @@
           <a:p>
             <a:fld id="{56CB71BA-E9E2-4B4F-82E8-D03ACE321088}" type="slidenum">
               <a:rPr lang="pt-BR" smtClean="0"/>
-              <a:t>‹nº›</a:t>
+              <a:t>‹#›</a:t>
             </a:fld>
             <a:endParaRPr lang="pt-BR"/>
           </a:p>
@@ -1956,7 +1956,7 @@
           <a:p>
             <a:fld id="{D7AB5D50-9DD8-4A40-877E-61895EE3D064}" type="datetimeFigureOut">
               <a:rPr lang="pt-BR" smtClean="0"/>
-              <a:t>19/10/2020</a:t>
+              <a:t>09/12/2020</a:t>
             </a:fld>
             <a:endParaRPr lang="pt-BR"/>
           </a:p>
@@ -2010,7 +2010,7 @@
           <a:p>
             <a:fld id="{56CB71BA-E9E2-4B4F-82E8-D03ACE321088}" type="slidenum">
               <a:rPr lang="pt-BR" smtClean="0"/>
-              <a:t>‹nº›</a:t>
+              <a:t>‹#›</a:t>
             </a:fld>
             <a:endParaRPr lang="pt-BR"/>
           </a:p>
@@ -2069,7 +2069,7 @@
           <a:p>
             <a:fld id="{D7AB5D50-9DD8-4A40-877E-61895EE3D064}" type="datetimeFigureOut">
               <a:rPr lang="pt-BR" smtClean="0"/>
-              <a:t>19/10/2020</a:t>
+              <a:t>09/12/2020</a:t>
             </a:fld>
             <a:endParaRPr lang="pt-BR"/>
           </a:p>
@@ -2123,7 +2123,7 @@
           <a:p>
             <a:fld id="{56CB71BA-E9E2-4B4F-82E8-D03ACE321088}" type="slidenum">
               <a:rPr lang="pt-BR" smtClean="0"/>
-              <a:t>‹nº›</a:t>
+              <a:t>‹#›</a:t>
             </a:fld>
             <a:endParaRPr lang="pt-BR"/>
           </a:p>
@@ -2380,7 +2380,7 @@
           <a:p>
             <a:fld id="{D7AB5D50-9DD8-4A40-877E-61895EE3D064}" type="datetimeFigureOut">
               <a:rPr lang="pt-BR" smtClean="0"/>
-              <a:t>19/10/2020</a:t>
+              <a:t>09/12/2020</a:t>
             </a:fld>
             <a:endParaRPr lang="pt-BR"/>
           </a:p>
@@ -2434,7 +2434,7 @@
           <a:p>
             <a:fld id="{56CB71BA-E9E2-4B4F-82E8-D03ACE321088}" type="slidenum">
               <a:rPr lang="pt-BR" smtClean="0"/>
-              <a:t>‹nº›</a:t>
+              <a:t>‹#›</a:t>
             </a:fld>
             <a:endParaRPr lang="pt-BR"/>
           </a:p>
@@ -2668,7 +2668,7 @@
           <a:p>
             <a:fld id="{D7AB5D50-9DD8-4A40-877E-61895EE3D064}" type="datetimeFigureOut">
               <a:rPr lang="pt-BR" smtClean="0"/>
-              <a:t>19/10/2020</a:t>
+              <a:t>09/12/2020</a:t>
             </a:fld>
             <a:endParaRPr lang="pt-BR"/>
           </a:p>
@@ -2722,7 +2722,7 @@
           <a:p>
             <a:fld id="{56CB71BA-E9E2-4B4F-82E8-D03ACE321088}" type="slidenum">
               <a:rPr lang="pt-BR" smtClean="0"/>
-              <a:t>‹nº›</a:t>
+              <a:t>‹#›</a:t>
             </a:fld>
             <a:endParaRPr lang="pt-BR"/>
           </a:p>
@@ -2909,7 +2909,7 @@
           <a:p>
             <a:fld id="{D7AB5D50-9DD8-4A40-877E-61895EE3D064}" type="datetimeFigureOut">
               <a:rPr lang="pt-BR" smtClean="0"/>
-              <a:t>19/10/2020</a:t>
+              <a:t>09/12/2020</a:t>
             </a:fld>
             <a:endParaRPr lang="pt-BR"/>
           </a:p>
@@ -2999,7 +2999,7 @@
           <a:p>
             <a:fld id="{56CB71BA-E9E2-4B4F-82E8-D03ACE321088}" type="slidenum">
               <a:rPr lang="pt-BR" smtClean="0"/>
-              <a:t>‹nº›</a:t>
+              <a:t>‹#›</a:t>
             </a:fld>
             <a:endParaRPr lang="pt-BR"/>
           </a:p>
@@ -3341,13 +3341,13 @@
           <p:nvPr>
             <p:extLst>
               <p:ext uri="{D42A27DB-BD31-4B8C-83A1-F6EECF244321}">
-                <p14:modId xmlns:p14="http://schemas.microsoft.com/office/powerpoint/2010/main" val="3162341755"/>
+                <p14:modId xmlns:p14="http://schemas.microsoft.com/office/powerpoint/2010/main" val="2042128473"/>
               </p:ext>
             </p:extLst>
           </p:nvPr>
         </p:nvGraphicFramePr>
         <p:xfrm>
-          <a:off x="905360" y="0"/>
+          <a:off x="901642" y="168811"/>
           <a:ext cx="10388716" cy="5212080"/>
         </p:xfrm>
         <a:graphic>

</xml_diff>